<commit_message>
Presentation slightly adapted to new template
</commit_message>
<xml_diff>
--- a/Slides/PresentationPhase2.pptx
+++ b/Slides/PresentationPhase2.pptx
@@ -5,7 +5,7 @@
     <p:sldMasterId id="2147483648" r:id="rId1"/>
   </p:sldMasterIdLst>
   <p:notesMasterIdLst>
-    <p:notesMasterId r:id="rId10"/>
+    <p:notesMasterId r:id="rId11"/>
   </p:notesMasterIdLst>
   <p:sldIdLst>
     <p:sldId id="256" r:id="rId2"/>
@@ -16,6 +16,7 @@
     <p:sldId id="352" r:id="rId7"/>
     <p:sldId id="353" r:id="rId8"/>
     <p:sldId id="341" r:id="rId9"/>
+    <p:sldId id="357" r:id="rId10"/>
   </p:sldIdLst>
   <p:sldSz cx="9144000" cy="6858000" type="screen4x3"/>
   <p:notesSz cx="6858000" cy="9144000"/>
@@ -1188,6 +1189,101 @@
     <p:extLst>
       <p:ext uri="{BB962C8B-B14F-4D97-AF65-F5344CB8AC3E}">
         <p14:creationId xmlns:p14="http://schemas.microsoft.com/office/powerpoint/2010/main" val="1958677172"/>
+      </p:ext>
+    </p:extLst>
+  </p:cSld>
+  <p:clrMapOvr>
+    <a:masterClrMapping/>
+  </p:clrMapOvr>
+</p:notes>
+</file>
+
+<file path=ppt/notesSlides/notesSlide9.xml><?xml version="1.0" encoding="utf-8"?>
+<p:notes xmlns:a="http://schemas.openxmlformats.org/drawingml/2006/main" xmlns:r="http://schemas.openxmlformats.org/officeDocument/2006/relationships" xmlns:p="http://schemas.openxmlformats.org/presentationml/2006/main">
+  <p:cSld>
+    <p:spTree>
+      <p:nvGrpSpPr>
+        <p:cNvPr id="1" name=""/>
+        <p:cNvGrpSpPr/>
+        <p:nvPr/>
+      </p:nvGrpSpPr>
+      <p:grpSpPr>
+        <a:xfrm>
+          <a:off x="0" y="0"/>
+          <a:ext cx="0" cy="0"/>
+          <a:chOff x="0" y="0"/>
+          <a:chExt cx="0" cy="0"/>
+        </a:xfrm>
+      </p:grpSpPr>
+      <p:sp>
+        <p:nvSpPr>
+          <p:cNvPr id="2" name="Slide Image Placeholder 1"/>
+          <p:cNvSpPr>
+            <a:spLocks noGrp="1" noRot="1" noChangeAspect="1"/>
+          </p:cNvSpPr>
+          <p:nvPr>
+            <p:ph type="sldImg"/>
+          </p:nvPr>
+        </p:nvSpPr>
+        <p:spPr/>
+      </p:sp>
+      <p:sp>
+        <p:nvSpPr>
+          <p:cNvPr id="3" name="Notes Placeholder 2"/>
+          <p:cNvSpPr>
+            <a:spLocks noGrp="1"/>
+          </p:cNvSpPr>
+          <p:nvPr>
+            <p:ph type="body" idx="1"/>
+          </p:nvPr>
+        </p:nvSpPr>
+        <p:spPr/>
+        <p:txBody>
+          <a:bodyPr>
+            <a:normAutofit/>
+          </a:bodyPr>
+          <a:lstStyle/>
+          <a:p>
+            <a:endParaRPr lang="en-US" baseline="0" dirty="0" smtClean="0"/>
+          </a:p>
+        </p:txBody>
+      </p:sp>
+      <p:sp>
+        <p:nvSpPr>
+          <p:cNvPr id="4" name="Slide Number Placeholder 3"/>
+          <p:cNvSpPr>
+            <a:spLocks noGrp="1"/>
+          </p:cNvSpPr>
+          <p:nvPr>
+            <p:ph type="sldNum" sz="quarter" idx="10"/>
+          </p:nvPr>
+        </p:nvSpPr>
+        <p:spPr/>
+        <p:txBody>
+          <a:bodyPr/>
+          <a:lstStyle/>
+          <a:p>
+            <a:fld id="{B12CE465-322E-43C5-86A7-A570B4F44A7C}" type="slidenum">
+              <a:rPr lang="en-US" smtClean="0">
+                <a:solidFill>
+                  <a:prstClr val="black"/>
+                </a:solidFill>
+              </a:rPr>
+              <a:pPr/>
+              <a:t>9</a:t>
+            </a:fld>
+            <a:endParaRPr lang="en-US">
+              <a:solidFill>
+                <a:prstClr val="black"/>
+              </a:solidFill>
+            </a:endParaRPr>
+          </a:p>
+        </p:txBody>
+      </p:sp>
+    </p:spTree>
+    <p:extLst>
+      <p:ext uri="{BB962C8B-B14F-4D97-AF65-F5344CB8AC3E}">
+        <p14:creationId xmlns:p14="http://schemas.microsoft.com/office/powerpoint/2010/main" val="1497010241"/>
       </p:ext>
     </p:extLst>
   </p:cSld>
@@ -4197,7 +4293,38 @@
                 <a:ea typeface="Tahoma" pitchFamily="34" charset="0"/>
                 <a:cs typeface="Tahoma" pitchFamily="34" charset="0"/>
               </a:rPr>
-              <a:t>Phase2: State Inspection</a:t>
+              <a:t>Phase2: State </a:t>
+            </a:r>
+            <a:r>
+              <a:rPr lang="en-US" sz="3600" b="1" dirty="0" smtClean="0">
+                <a:latin typeface="Trebuchet MS" pitchFamily="34" charset="0"/>
+                <a:ea typeface="Tahoma" pitchFamily="34" charset="0"/>
+                <a:cs typeface="Tahoma" pitchFamily="34" charset="0"/>
+              </a:rPr>
+              <a:t>Inspection</a:t>
+            </a:r>
+            <a:r>
+              <a:rPr lang="en-US" sz="3200" b="1" dirty="0">
+                <a:latin typeface="Trebuchet MS" pitchFamily="34" charset="0"/>
+                <a:ea typeface="Tahoma" pitchFamily="34" charset="0"/>
+                <a:cs typeface="Tahoma" pitchFamily="34" charset="0"/>
+              </a:rPr>
+              <a:t/>
+            </a:r>
+            <a:br>
+              <a:rPr lang="en-US" sz="3200" b="1" dirty="0">
+                <a:latin typeface="Trebuchet MS" pitchFamily="34" charset="0"/>
+                <a:ea typeface="Tahoma" pitchFamily="34" charset="0"/>
+                <a:cs typeface="Tahoma" pitchFamily="34" charset="0"/>
+              </a:rPr>
+            </a:br>
+            <a:r>
+              <a:rPr lang="en-US" sz="3200" b="1" dirty="0">
+                <a:latin typeface="Trebuchet MS" pitchFamily="34" charset="0"/>
+                <a:ea typeface="Tahoma" pitchFamily="34" charset="0"/>
+                <a:cs typeface="Tahoma" pitchFamily="34" charset="0"/>
+              </a:rPr>
+              <a:t>Control Flow Integrity</a:t>
             </a:r>
             <a:endParaRPr lang="en-US" sz="3200" b="1" dirty="0">
               <a:latin typeface="Trebuchet MS" pitchFamily="34" charset="0"/>
@@ -4497,13 +4624,6 @@
               </a:rPr>
               <a:t>void response()</a:t>
             </a:r>
-            <a:endParaRPr lang="en-US" sz="2800" dirty="0" smtClean="0">
-              <a:solidFill>
-                <a:srgbClr val="003399"/>
-              </a:solidFill>
-              <a:latin typeface="Gill Sans MT" pitchFamily="34" charset="0"/>
-              <a:cs typeface="Consolas" pitchFamily="49" charset="0"/>
-            </a:endParaRPr>
           </a:p>
           <a:p>
             <a:pPr marL="457200" indent="-457200">
@@ -4550,13 +4670,6 @@
               </a:rPr>
               <a:t>()</a:t>
             </a:r>
-            <a:endParaRPr lang="en-US" sz="2800" dirty="0" smtClean="0">
-              <a:solidFill>
-                <a:srgbClr val="003399"/>
-              </a:solidFill>
-              <a:latin typeface="Gill Sans MT" pitchFamily="34" charset="0"/>
-              <a:cs typeface="Consolas" pitchFamily="49" charset="0"/>
-            </a:endParaRPr>
           </a:p>
           <a:p>
             <a:pPr marL="457200" indent="-457200">
@@ -4715,7 +4828,27 @@
                 <a:latin typeface="Trebuchet MS" pitchFamily="34" charset="0"/>
                 <a:cs typeface="Consolas" pitchFamily="49" charset="0"/>
               </a:rPr>
-              <a:t>LLVM Pass</a:t>
+              <a:t>Transformation</a:t>
+            </a:r>
+            <a:r>
+              <a:rPr lang="en-US" sz="3600" b="1" dirty="0" smtClean="0">
+                <a:solidFill>
+                  <a:srgbClr val="003399"/>
+                </a:solidFill>
+                <a:latin typeface="Trebuchet MS" pitchFamily="34" charset="0"/>
+                <a:cs typeface="Consolas" pitchFamily="49" charset="0"/>
+              </a:rPr>
+              <a:t> </a:t>
+            </a:r>
+            <a:r>
+              <a:rPr lang="en-US" sz="3600" b="1" dirty="0" smtClean="0">
+                <a:solidFill>
+                  <a:srgbClr val="003399"/>
+                </a:solidFill>
+                <a:latin typeface="Trebuchet MS" pitchFamily="34" charset="0"/>
+                <a:cs typeface="Consolas" pitchFamily="49" charset="0"/>
+              </a:rPr>
+              <a:t>Pass</a:t>
             </a:r>
             <a:endParaRPr lang="en-US" sz="3600" b="1" dirty="0">
               <a:solidFill>
@@ -4893,13 +5026,6 @@
               </a:rPr>
               <a:t>Iterate over statements, on every function call, add new edge to call graph (own implementation)</a:t>
             </a:r>
-            <a:endParaRPr lang="en-US" sz="2800" dirty="0" smtClean="0">
-              <a:solidFill>
-                <a:srgbClr val="003399"/>
-              </a:solidFill>
-              <a:latin typeface="Gill Sans MT" pitchFamily="34" charset="0"/>
-              <a:cs typeface="Consolas" pitchFamily="49" charset="0"/>
-            </a:endParaRPr>
           </a:p>
           <a:p>
             <a:pPr marL="457200" indent="-457200">
@@ -5040,7 +5166,7 @@
         <p:spPr>
           <a:xfrm>
             <a:off x="152400" y="533400"/>
-            <a:ext cx="4800600" cy="609600"/>
+            <a:ext cx="5499720" cy="609600"/>
           </a:xfrm>
         </p:spPr>
         <p:txBody>
@@ -5058,7 +5184,47 @@
                 <a:latin typeface="Trebuchet MS" pitchFamily="34" charset="0"/>
                 <a:cs typeface="Consolas" pitchFamily="49" charset="0"/>
               </a:rPr>
-              <a:t>Stack verification</a:t>
+              <a:t>Stack </a:t>
+            </a:r>
+            <a:r>
+              <a:rPr lang="en-US" sz="3600" b="1" dirty="0">
+                <a:solidFill>
+                  <a:srgbClr val="003399"/>
+                </a:solidFill>
+                <a:latin typeface="Trebuchet MS" pitchFamily="34" charset="0"/>
+                <a:cs typeface="Consolas" pitchFamily="49" charset="0"/>
+              </a:rPr>
+              <a:t>t</a:t>
+            </a:r>
+            <a:r>
+              <a:rPr lang="en-US" sz="3600" b="1" dirty="0" smtClean="0">
+                <a:solidFill>
+                  <a:srgbClr val="003399"/>
+                </a:solidFill>
+                <a:latin typeface="Trebuchet MS" pitchFamily="34" charset="0"/>
+                <a:cs typeface="Consolas" pitchFamily="49" charset="0"/>
+              </a:rPr>
+              <a:t>race </a:t>
+            </a:r>
+            <a:r>
+              <a:rPr lang="en-US" sz="3600" b="1" dirty="0">
+                <a:solidFill>
+                  <a:srgbClr val="003399"/>
+                </a:solidFill>
+                <a:latin typeface="Trebuchet MS" pitchFamily="34" charset="0"/>
+                <a:cs typeface="Consolas" pitchFamily="49" charset="0"/>
+              </a:rPr>
+              <a:t>v</a:t>
+            </a:r>
+            <a:r>
+              <a:rPr lang="en-US" sz="3600" b="1" dirty="0" smtClean="0">
+                <a:solidFill>
+                  <a:srgbClr val="003399"/>
+                </a:solidFill>
+                <a:latin typeface="Trebuchet MS" pitchFamily="34" charset="0"/>
+                <a:cs typeface="Consolas" pitchFamily="49" charset="0"/>
+              </a:rPr>
+              <a:t>erification</a:t>
             </a:r>
             <a:endParaRPr lang="en-US" sz="3600" b="1" dirty="0">
               <a:solidFill>
@@ -5225,17 +5391,7 @@
                 <a:latin typeface="Gill Sans MT" pitchFamily="34" charset="0"/>
                 <a:cs typeface="Consolas" pitchFamily="49" charset="0"/>
               </a:rPr>
-              <a:t>⇒ No </a:t>
-            </a:r>
-            <a:r>
-              <a:rPr lang="en-US" sz="2800" dirty="0" smtClean="0">
-                <a:solidFill>
-                  <a:srgbClr val="003399"/>
-                </a:solidFill>
-                <a:latin typeface="Gill Sans MT" pitchFamily="34" charset="0"/>
-                <a:cs typeface="Consolas" pitchFamily="49" charset="0"/>
-              </a:rPr>
-              <a:t>hashing but check every state</a:t>
+              <a:t>⇒ No hashing but check every state</a:t>
             </a:r>
           </a:p>
           <a:p>
@@ -5569,13 +5725,6 @@
               </a:rPr>
               <a:t>Extensions: Different response depending on sensitive function</a:t>
             </a:r>
-            <a:endParaRPr lang="en-US" sz="2800" dirty="0" smtClean="0">
-              <a:solidFill>
-                <a:srgbClr val="003399"/>
-              </a:solidFill>
-              <a:latin typeface="Gill Sans MT" pitchFamily="34" charset="0"/>
-              <a:cs typeface="Consolas" pitchFamily="49" charset="0"/>
-            </a:endParaRPr>
           </a:p>
           <a:p>
             <a:pPr marL="457200" indent="-457200">
@@ -5804,13 +5953,6 @@
               </a:rPr>
               <a:t>Fast instrumentation, only small increase with increasing number of functions</a:t>
             </a:r>
-            <a:endParaRPr lang="en-US" sz="2800" dirty="0" smtClean="0">
-              <a:solidFill>
-                <a:srgbClr val="003399"/>
-              </a:solidFill>
-              <a:latin typeface="Gill Sans MT" pitchFamily="34" charset="0"/>
-              <a:cs typeface="Consolas" pitchFamily="49" charset="0"/>
-            </a:endParaRPr>
           </a:p>
           <a:p>
             <a:pPr marL="457200" indent="-457200">
@@ -5843,13 +5985,6 @@
               </a:rPr>
               <a:t>Runtime overhead: Increase of 48% for stack management, depends on number of paths to sensitive functions and number of sensitive functions</a:t>
             </a:r>
-            <a:endParaRPr lang="en-US" sz="2800" dirty="0" smtClean="0">
-              <a:solidFill>
-                <a:srgbClr val="003399"/>
-              </a:solidFill>
-              <a:latin typeface="Gill Sans MT" pitchFamily="34" charset="0"/>
-              <a:cs typeface="Consolas" pitchFamily="49" charset="0"/>
-            </a:endParaRPr>
           </a:p>
           <a:p>
             <a:pPr marL="457200" indent="-457200">
@@ -6088,7 +6223,7 @@
                 <a:latin typeface="Trebuchet MS" pitchFamily="34" charset="0"/>
                 <a:cs typeface="Consolas" pitchFamily="49" charset="0"/>
               </a:rPr>
-              <a:t>DEMO</a:t>
+              <a:t>Automated attacks</a:t>
             </a:r>
             <a:endParaRPr lang="en-US" sz="3600" b="1" dirty="0">
               <a:solidFill>
@@ -6193,8 +6328,35 @@
                 <a:latin typeface="Gill Sans MT" pitchFamily="34" charset="0"/>
                 <a:cs typeface="Consolas" pitchFamily="49" charset="0"/>
               </a:rPr>
-              <a:t>Tool demonstration</a:t>
-            </a:r>
+              <a:t>Modifying the </a:t>
+            </a:r>
+            <a:r>
+              <a:rPr lang="en-US" sz="2800" dirty="0" err="1" smtClean="0">
+                <a:solidFill>
+                  <a:srgbClr val="003399"/>
+                </a:solidFill>
+                <a:latin typeface="Gill Sans MT" pitchFamily="34" charset="0"/>
+                <a:cs typeface="Consolas" pitchFamily="49" charset="0"/>
+              </a:rPr>
+              <a:t>graph.txt</a:t>
+            </a:r>
+            <a:r>
+              <a:rPr lang="en-US" sz="2800" dirty="0" smtClean="0">
+                <a:solidFill>
+                  <a:srgbClr val="003399"/>
+                </a:solidFill>
+                <a:latin typeface="Gill Sans MT" pitchFamily="34" charset="0"/>
+                <a:cs typeface="Consolas" pitchFamily="49" charset="0"/>
+              </a:rPr>
+              <a:t> file and patch new checksum</a:t>
+            </a:r>
+            <a:endParaRPr lang="en-US" sz="2800" dirty="0" smtClean="0">
+              <a:solidFill>
+                <a:srgbClr val="003399"/>
+              </a:solidFill>
+              <a:latin typeface="Gill Sans MT" pitchFamily="34" charset="0"/>
+              <a:cs typeface="Consolas" pitchFamily="49" charset="0"/>
+            </a:endParaRPr>
           </a:p>
           <a:p>
             <a:pPr marL="457200" indent="-457200">
@@ -6209,7 +6371,7 @@
                 <a:latin typeface="Gill Sans MT" pitchFamily="34" charset="0"/>
                 <a:cs typeface="Consolas" pitchFamily="49" charset="0"/>
               </a:rPr>
-              <a:t>Attack: Modifying the </a:t>
+              <a:t>Overwrite call of </a:t>
             </a:r>
             <a:r>
               <a:rPr lang="en-US" sz="2800" dirty="0" err="1" smtClean="0">
@@ -6219,7 +6381,7 @@
                 <a:latin typeface="Gill Sans MT" pitchFamily="34" charset="0"/>
                 <a:cs typeface="Consolas" pitchFamily="49" charset="0"/>
               </a:rPr>
-              <a:t>graph.txt</a:t>
+              <a:t>verifyStack</a:t>
             </a:r>
             <a:r>
               <a:rPr lang="en-US" sz="2800" dirty="0" smtClean="0">
@@ -6229,7 +6391,7 @@
                 <a:latin typeface="Gill Sans MT" pitchFamily="34" charset="0"/>
                 <a:cs typeface="Consolas" pitchFamily="49" charset="0"/>
               </a:rPr>
-              <a:t> file</a:t>
+              <a:t>() with NOPs</a:t>
             </a:r>
             <a:endParaRPr lang="en-US" sz="2800" dirty="0" smtClean="0">
               <a:solidFill>
@@ -6284,6 +6446,312 @@
     <p:extLst>
       <p:ext uri="{BB962C8B-B14F-4D97-AF65-F5344CB8AC3E}">
         <p14:creationId xmlns:p14="http://schemas.microsoft.com/office/powerpoint/2010/main" val="963781778"/>
+      </p:ext>
+    </p:extLst>
+  </p:cSld>
+  <p:clrMapOvr>
+    <a:masterClrMapping/>
+  </p:clrMapOvr>
+  <p:timing>
+    <p:tnLst>
+      <p:par>
+        <p:cTn id="1" dur="indefinite" restart="never" nodeType="tmRoot"/>
+      </p:par>
+    </p:tnLst>
+  </p:timing>
+</p:sld>
+</file>
+
+<file path=ppt/slides/slide9.xml><?xml version="1.0" encoding="utf-8"?>
+<p:sld xmlns:a="http://schemas.openxmlformats.org/drawingml/2006/main" xmlns:r="http://schemas.openxmlformats.org/officeDocument/2006/relationships" xmlns:p="http://schemas.openxmlformats.org/presentationml/2006/main">
+  <p:cSld>
+    <p:spTree>
+      <p:nvGrpSpPr>
+        <p:cNvPr id="1" name=""/>
+        <p:cNvGrpSpPr/>
+        <p:nvPr/>
+      </p:nvGrpSpPr>
+      <p:grpSpPr>
+        <a:xfrm>
+          <a:off x="0" y="0"/>
+          <a:ext cx="0" cy="0"/>
+          <a:chOff x="0" y="0"/>
+          <a:chExt cx="0" cy="0"/>
+        </a:xfrm>
+      </p:grpSpPr>
+      <p:sp>
+        <p:nvSpPr>
+          <p:cNvPr id="3" name="Subtitle 2"/>
+          <p:cNvSpPr>
+            <a:spLocks noGrp="1"/>
+          </p:cNvSpPr>
+          <p:nvPr>
+            <p:ph type="subTitle" idx="1"/>
+          </p:nvPr>
+        </p:nvSpPr>
+        <p:spPr>
+          <a:xfrm>
+            <a:off x="152400" y="533400"/>
+            <a:ext cx="7543800" cy="609600"/>
+          </a:xfrm>
+        </p:spPr>
+        <p:txBody>
+          <a:bodyPr>
+            <a:noAutofit/>
+          </a:bodyPr>
+          <a:lstStyle/>
+          <a:p>
+            <a:pPr algn="l"/>
+            <a:r>
+              <a:rPr lang="en-US" sz="3600" b="1" dirty="0" smtClean="0">
+                <a:solidFill>
+                  <a:srgbClr val="003399"/>
+                </a:solidFill>
+                <a:latin typeface="Trebuchet MS" pitchFamily="34" charset="0"/>
+                <a:cs typeface="Consolas" pitchFamily="49" charset="0"/>
+              </a:rPr>
+              <a:t>DEMO</a:t>
+            </a:r>
+            <a:endParaRPr lang="en-US" sz="3600" b="1" dirty="0">
+              <a:solidFill>
+                <a:srgbClr val="003399"/>
+              </a:solidFill>
+              <a:latin typeface="Trebuchet MS" pitchFamily="34" charset="0"/>
+              <a:cs typeface="Consolas" pitchFamily="49" charset="0"/>
+            </a:endParaRPr>
+          </a:p>
+        </p:txBody>
+      </p:sp>
+      <p:sp>
+        <p:nvSpPr>
+          <p:cNvPr id="12" name="Slide Number Placeholder 11"/>
+          <p:cNvSpPr>
+            <a:spLocks noGrp="1"/>
+          </p:cNvSpPr>
+          <p:nvPr>
+            <p:ph type="sldNum" sz="quarter" idx="12"/>
+          </p:nvPr>
+        </p:nvSpPr>
+        <p:spPr/>
+        <p:txBody>
+          <a:bodyPr/>
+          <a:lstStyle/>
+          <a:p>
+            <a:fld id="{E0403E93-506C-40CD-893C-0CEDCA522EA1}" type="slidenum">
+              <a:rPr lang="en-US" smtClean="0">
+                <a:solidFill>
+                  <a:prstClr val="black">
+                    <a:tint val="75000"/>
+                  </a:prstClr>
+                </a:solidFill>
+              </a:rPr>
+              <a:pPr/>
+              <a:t>9</a:t>
+            </a:fld>
+            <a:endParaRPr lang="en-US">
+              <a:solidFill>
+                <a:prstClr val="black">
+                  <a:tint val="75000"/>
+                </a:prstClr>
+              </a:solidFill>
+            </a:endParaRPr>
+          </a:p>
+        </p:txBody>
+      </p:sp>
+      <p:pic>
+        <p:nvPicPr>
+          <p:cNvPr id="6" name="Picture 5" descr="tumlogo.gif"/>
+          <p:cNvPicPr>
+            <a:picLocks noChangeAspect="1"/>
+          </p:cNvPicPr>
+          <p:nvPr/>
+        </p:nvPicPr>
+        <p:blipFill>
+          <a:blip r:embed="rId3"/>
+          <a:stretch>
+            <a:fillRect/>
+          </a:stretch>
+        </p:blipFill>
+        <p:spPr>
+          <a:xfrm>
+            <a:off x="7696200" y="152400"/>
+            <a:ext cx="1362701" cy="762000"/>
+          </a:xfrm>
+          <a:prstGeom prst="rect">
+            <a:avLst/>
+          </a:prstGeom>
+        </p:spPr>
+      </p:pic>
+      <p:sp>
+        <p:nvSpPr>
+          <p:cNvPr id="5" name="Rectangle 10"/>
+          <p:cNvSpPr/>
+          <p:nvPr/>
+        </p:nvSpPr>
+        <p:spPr>
+          <a:xfrm>
+            <a:off x="304800" y="1412776"/>
+            <a:ext cx="8515672" cy="2677656"/>
+          </a:xfrm>
+          <a:prstGeom prst="rect">
+            <a:avLst/>
+          </a:prstGeom>
+        </p:spPr>
+        <p:txBody>
+          <a:bodyPr wrap="square">
+            <a:spAutoFit/>
+          </a:bodyPr>
+          <a:lstStyle/>
+          <a:p>
+            <a:pPr marL="457200" indent="-457200">
+              <a:buFont typeface="Arial" charset="0"/>
+              <a:buChar char="•"/>
+            </a:pPr>
+            <a:r>
+              <a:rPr lang="en-US" sz="2800" dirty="0" smtClean="0">
+                <a:solidFill>
+                  <a:srgbClr val="003399"/>
+                </a:solidFill>
+                <a:latin typeface="Gill Sans MT" pitchFamily="34" charset="0"/>
+                <a:cs typeface="Consolas" pitchFamily="49" charset="0"/>
+              </a:rPr>
+              <a:t>Tool demonstration</a:t>
+            </a:r>
+          </a:p>
+          <a:p>
+            <a:pPr marL="457200" indent="-457200">
+              <a:buFont typeface="Arial" charset="0"/>
+              <a:buChar char="•"/>
+            </a:pPr>
+            <a:r>
+              <a:rPr lang="en-US" sz="2800" dirty="0" smtClean="0">
+                <a:solidFill>
+                  <a:srgbClr val="003399"/>
+                </a:solidFill>
+                <a:latin typeface="Gill Sans MT" pitchFamily="34" charset="0"/>
+                <a:cs typeface="Consolas" pitchFamily="49" charset="0"/>
+              </a:rPr>
+              <a:t>Attack: Modifying the </a:t>
+            </a:r>
+            <a:r>
+              <a:rPr lang="en-US" sz="2800" dirty="0" err="1" smtClean="0">
+                <a:solidFill>
+                  <a:srgbClr val="003399"/>
+                </a:solidFill>
+                <a:latin typeface="Gill Sans MT" pitchFamily="34" charset="0"/>
+                <a:cs typeface="Consolas" pitchFamily="49" charset="0"/>
+              </a:rPr>
+              <a:t>graph.txt</a:t>
+            </a:r>
+            <a:r>
+              <a:rPr lang="en-US" sz="2800" dirty="0" smtClean="0">
+                <a:solidFill>
+                  <a:srgbClr val="003399"/>
+                </a:solidFill>
+                <a:latin typeface="Gill Sans MT" pitchFamily="34" charset="0"/>
+                <a:cs typeface="Consolas" pitchFamily="49" charset="0"/>
+              </a:rPr>
+              <a:t> </a:t>
+            </a:r>
+            <a:r>
+              <a:rPr lang="en-US" sz="2800" dirty="0" smtClean="0">
+                <a:solidFill>
+                  <a:srgbClr val="003399"/>
+                </a:solidFill>
+                <a:latin typeface="Gill Sans MT" pitchFamily="34" charset="0"/>
+                <a:cs typeface="Consolas" pitchFamily="49" charset="0"/>
+              </a:rPr>
+              <a:t>file</a:t>
+            </a:r>
+          </a:p>
+          <a:p>
+            <a:pPr marL="457200" indent="-457200">
+              <a:buFont typeface="Arial" charset="0"/>
+              <a:buChar char="•"/>
+            </a:pPr>
+            <a:r>
+              <a:rPr lang="en-US" sz="2800" dirty="0" smtClean="0">
+                <a:solidFill>
+                  <a:srgbClr val="003399"/>
+                </a:solidFill>
+                <a:latin typeface="Gill Sans MT" pitchFamily="34" charset="0"/>
+                <a:cs typeface="Consolas" pitchFamily="49" charset="0"/>
+              </a:rPr>
+              <a:t>Attack: Overwrite call to </a:t>
+            </a:r>
+            <a:r>
+              <a:rPr lang="en-US" sz="2800" dirty="0" err="1" smtClean="0">
+                <a:solidFill>
+                  <a:srgbClr val="003399"/>
+                </a:solidFill>
+                <a:latin typeface="Gill Sans MT" pitchFamily="34" charset="0"/>
+                <a:cs typeface="Consolas" pitchFamily="49" charset="0"/>
+              </a:rPr>
+              <a:t>verifyStack</a:t>
+            </a:r>
+            <a:r>
+              <a:rPr lang="en-US" sz="2800" dirty="0" smtClean="0">
+                <a:solidFill>
+                  <a:srgbClr val="003399"/>
+                </a:solidFill>
+                <a:latin typeface="Gill Sans MT" pitchFamily="34" charset="0"/>
+                <a:cs typeface="Consolas" pitchFamily="49" charset="0"/>
+              </a:rPr>
+              <a:t>()</a:t>
+            </a:r>
+            <a:endParaRPr lang="en-US" sz="2800" dirty="0" smtClean="0">
+              <a:solidFill>
+                <a:srgbClr val="003399"/>
+              </a:solidFill>
+              <a:latin typeface="Gill Sans MT" pitchFamily="34" charset="0"/>
+              <a:cs typeface="Consolas" pitchFamily="49" charset="0"/>
+            </a:endParaRPr>
+          </a:p>
+          <a:p>
+            <a:pPr marL="457200" indent="-457200">
+              <a:buFont typeface="Arial" charset="0"/>
+              <a:buChar char="•"/>
+            </a:pPr>
+            <a:endParaRPr lang="en-US" sz="2800" dirty="0" smtClean="0">
+              <a:solidFill>
+                <a:srgbClr val="003399"/>
+              </a:solidFill>
+              <a:latin typeface="Gill Sans MT" pitchFamily="34" charset="0"/>
+              <a:cs typeface="Consolas" pitchFamily="49" charset="0"/>
+            </a:endParaRPr>
+          </a:p>
+          <a:p>
+            <a:pPr marL="457200" indent="-457200">
+              <a:buFont typeface="Arial" charset="0"/>
+              <a:buChar char="•"/>
+            </a:pPr>
+            <a:endParaRPr lang="en-US" sz="2800" dirty="0" smtClean="0">
+              <a:solidFill>
+                <a:srgbClr val="003399"/>
+              </a:solidFill>
+              <a:latin typeface="Gill Sans MT" pitchFamily="34" charset="0"/>
+              <a:cs typeface="Consolas" pitchFamily="49" charset="0"/>
+            </a:endParaRPr>
+          </a:p>
+          <a:p>
+            <a:pPr marL="457200" indent="-457200">
+              <a:buFont typeface="Arial" charset="0"/>
+              <a:buChar char="•"/>
+            </a:pPr>
+            <a:endParaRPr lang="en-US" sz="2800" dirty="0">
+              <a:solidFill>
+                <a:srgbClr val="003399"/>
+              </a:solidFill>
+              <a:latin typeface="Gill Sans MT" pitchFamily="34" charset="0"/>
+              <a:cs typeface="Consolas" pitchFamily="49" charset="0"/>
+            </a:endParaRPr>
+          </a:p>
+        </p:txBody>
+      </p:sp>
+    </p:spTree>
+    <p:extLst>
+      <p:ext uri="{BB962C8B-B14F-4D97-AF65-F5344CB8AC3E}">
+        <p14:creationId xmlns:p14="http://schemas.microsoft.com/office/powerpoint/2010/main" val="618255661"/>
       </p:ext>
     </p:extLst>
   </p:cSld>

</xml_diff>

<commit_message>
Attack tree++ and presentation pdf
</commit_message>
<xml_diff>
--- a/Slides/PresentationPhase2.pptx
+++ b/Slides/PresentationPhase2.pptx
@@ -4293,15 +4293,7 @@
                 <a:ea typeface="Tahoma" pitchFamily="34" charset="0"/>
                 <a:cs typeface="Tahoma" pitchFamily="34" charset="0"/>
               </a:rPr>
-              <a:t>Phase2: State </a:t>
-            </a:r>
-            <a:r>
-              <a:rPr lang="en-US" sz="3600" b="1" dirty="0" smtClean="0">
-                <a:latin typeface="Trebuchet MS" pitchFamily="34" charset="0"/>
-                <a:ea typeface="Tahoma" pitchFamily="34" charset="0"/>
-                <a:cs typeface="Tahoma" pitchFamily="34" charset="0"/>
-              </a:rPr>
-              <a:t>Inspection</a:t>
+              <a:t>Phase2: State Inspection</a:t>
             </a:r>
             <a:r>
               <a:rPr lang="en-US" sz="3200" b="1" dirty="0">
@@ -4326,11 +4318,6 @@
               </a:rPr>
               <a:t>Control Flow Integrity</a:t>
             </a:r>
-            <a:endParaRPr lang="en-US" sz="3200" b="1" dirty="0">
-              <a:latin typeface="Trebuchet MS" pitchFamily="34" charset="0"/>
-              <a:ea typeface="Tahoma" pitchFamily="34" charset="0"/>
-              <a:cs typeface="Tahoma" pitchFamily="34" charset="0"/>
-            </a:endParaRPr>
           </a:p>
         </p:txBody>
       </p:sp>
@@ -4828,27 +4815,7 @@
                 <a:latin typeface="Trebuchet MS" pitchFamily="34" charset="0"/>
                 <a:cs typeface="Consolas" pitchFamily="49" charset="0"/>
               </a:rPr>
-              <a:t>Transformation</a:t>
-            </a:r>
-            <a:r>
-              <a:rPr lang="en-US" sz="3600" b="1" dirty="0" smtClean="0">
-                <a:solidFill>
-                  <a:srgbClr val="003399"/>
-                </a:solidFill>
-                <a:latin typeface="Trebuchet MS" pitchFamily="34" charset="0"/>
-                <a:cs typeface="Consolas" pitchFamily="49" charset="0"/>
-              </a:rPr>
-              <a:t> </a:t>
-            </a:r>
-            <a:r>
-              <a:rPr lang="en-US" sz="3600" b="1" dirty="0" smtClean="0">
-                <a:solidFill>
-                  <a:srgbClr val="003399"/>
-                </a:solidFill>
-                <a:latin typeface="Trebuchet MS" pitchFamily="34" charset="0"/>
-                <a:cs typeface="Consolas" pitchFamily="49" charset="0"/>
-              </a:rPr>
-              <a:t>Pass</a:t>
+              <a:t>Transformation Pass</a:t>
             </a:r>
             <a:endParaRPr lang="en-US" sz="3600" b="1" dirty="0">
               <a:solidFill>
@@ -6155,6 +6122,36 @@
           </a:prstGeom>
         </p:spPr>
       </p:pic>
+      <p:pic>
+        <p:nvPicPr>
+          <p:cNvPr id="2" name="Bild 1"/>
+          <p:cNvPicPr>
+            <a:picLocks noChangeAspect="1"/>
+          </p:cNvPicPr>
+          <p:nvPr/>
+        </p:nvPicPr>
+        <p:blipFill>
+          <a:blip r:embed="rId4">
+            <a:extLst>
+              <a:ext uri="{28A0092B-C50C-407E-A947-70E740481C1C}">
+                <a14:useLocalDpi xmlns:a14="http://schemas.microsoft.com/office/drawing/2010/main" val="0"/>
+              </a:ext>
+            </a:extLst>
+          </a:blip>
+          <a:stretch>
+            <a:fillRect/>
+          </a:stretch>
+        </p:blipFill>
+        <p:spPr>
+          <a:xfrm>
+            <a:off x="0" y="2006600"/>
+            <a:ext cx="9144000" cy="2824196"/>
+          </a:xfrm>
+          <a:prstGeom prst="rect">
+            <a:avLst/>
+          </a:prstGeom>
+        </p:spPr>
+      </p:pic>
     </p:spTree>
     <p:extLst>
       <p:ext uri="{BB962C8B-B14F-4D97-AF65-F5344CB8AC3E}">
@@ -6350,13 +6347,6 @@
               </a:rPr>
               <a:t> file and patch new checksum</a:t>
             </a:r>
-            <a:endParaRPr lang="en-US" sz="2800" dirty="0" smtClean="0">
-              <a:solidFill>
-                <a:srgbClr val="003399"/>
-              </a:solidFill>
-              <a:latin typeface="Gill Sans MT" pitchFamily="34" charset="0"/>
-              <a:cs typeface="Consolas" pitchFamily="49" charset="0"/>
-            </a:endParaRPr>
           </a:p>
           <a:p>
             <a:pPr marL="457200" indent="-457200">
@@ -6393,13 +6383,6 @@
               </a:rPr>
               <a:t>() with NOPs</a:t>
             </a:r>
-            <a:endParaRPr lang="en-US" sz="2800" dirty="0" smtClean="0">
-              <a:solidFill>
-                <a:srgbClr val="003399"/>
-              </a:solidFill>
-              <a:latin typeface="Gill Sans MT" pitchFamily="34" charset="0"/>
-              <a:cs typeface="Consolas" pitchFamily="49" charset="0"/>
-            </a:endParaRPr>
           </a:p>
           <a:p>
             <a:pPr marL="457200" indent="-457200">
@@ -6651,17 +6634,7 @@
                 <a:latin typeface="Gill Sans MT" pitchFamily="34" charset="0"/>
                 <a:cs typeface="Consolas" pitchFamily="49" charset="0"/>
               </a:rPr>
-              <a:t> </a:t>
-            </a:r>
-            <a:r>
-              <a:rPr lang="en-US" sz="2800" dirty="0" smtClean="0">
-                <a:solidFill>
-                  <a:srgbClr val="003399"/>
-                </a:solidFill>
-                <a:latin typeface="Gill Sans MT" pitchFamily="34" charset="0"/>
-                <a:cs typeface="Consolas" pitchFamily="49" charset="0"/>
-              </a:rPr>
-              <a:t>file</a:t>
+              <a:t> file</a:t>
             </a:r>
           </a:p>
           <a:p>
@@ -6699,13 +6672,6 @@
               </a:rPr>
               <a:t>()</a:t>
             </a:r>
-            <a:endParaRPr lang="en-US" sz="2800" dirty="0" smtClean="0">
-              <a:solidFill>
-                <a:srgbClr val="003399"/>
-              </a:solidFill>
-              <a:latin typeface="Gill Sans MT" pitchFamily="34" charset="0"/>
-              <a:cs typeface="Consolas" pitchFamily="49" charset="0"/>
-            </a:endParaRPr>
           </a:p>
           <a:p>
             <a:pPr marL="457200" indent="-457200">

</xml_diff>